<commit_message>
COBOL Merge SOrt and File IO
</commit_message>
<xml_diff>
--- a/COBOL/COBOLPresentation.pptx
+++ b/COBOL/COBOLPresentation.pptx
@@ -16,6 +16,7 @@
     <p:sldId id="261" r:id="rId10"/>
     <p:sldId id="262" r:id="rId11"/>
     <p:sldId id="266" r:id="rId12"/>
+    <p:sldId id="268" r:id="rId13"/>
   </p:sldIdLst>
   <p:sldSz cx="12192000" cy="6858000"/>
   <p:notesSz cx="6858000" cy="9144000"/>
@@ -3511,6 +3512,772 @@
 </p:sld>
 </file>
 
+<file path=ppt/slides/slide12.xml><?xml version="1.0" encoding="utf-8"?>
+<p:sld xmlns:a="http://schemas.openxmlformats.org/drawingml/2006/main" xmlns:r="http://schemas.openxmlformats.org/officeDocument/2006/relationships" xmlns:p="http://schemas.openxmlformats.org/presentationml/2006/main">
+  <p:cSld>
+    <p:spTree>
+      <p:nvGrpSpPr>
+        <p:cNvPr id="1" name=""/>
+        <p:cNvGrpSpPr/>
+        <p:nvPr/>
+      </p:nvGrpSpPr>
+      <p:grpSpPr>
+        <a:xfrm>
+          <a:off x="0" y="0"/>
+          <a:ext cx="0" cy="0"/>
+          <a:chOff x="0" y="0"/>
+          <a:chExt cx="0" cy="0"/>
+        </a:xfrm>
+      </p:grpSpPr>
+      <p:sp>
+        <p:nvSpPr>
+          <p:cNvPr id="4" name="Title 3"/>
+          <p:cNvSpPr>
+            <a:spLocks noGrp="1"/>
+          </p:cNvSpPr>
+          <p:nvPr>
+            <p:ph type="title"/>
+          </p:nvPr>
+        </p:nvSpPr>
+        <p:spPr/>
+        <p:txBody>
+          <a:bodyPr/>
+          <a:lstStyle/>
+          <a:p>
+            <a:r>
+              <a:rPr lang="en-US" dirty="0"/>
+              <a:t>Merge Sort and File IO</a:t>
+            </a:r>
+          </a:p>
+        </p:txBody>
+      </p:sp>
+      <p:sp>
+        <p:nvSpPr>
+          <p:cNvPr id="5" name="Content Placeholder 4"/>
+          <p:cNvSpPr>
+            <a:spLocks noGrp="1"/>
+          </p:cNvSpPr>
+          <p:nvPr>
+            <p:ph sz="half" idx="1"/>
+          </p:nvPr>
+        </p:nvSpPr>
+        <p:spPr>
+          <a:xfrm>
+            <a:off x="838200" y="1825625"/>
+            <a:ext cx="3188516" cy="4351338"/>
+          </a:xfrm>
+        </p:spPr>
+        <p:txBody>
+          <a:bodyPr>
+            <a:normAutofit fontScale="25000" lnSpcReduction="20000"/>
+          </a:bodyPr>
+          <a:lstStyle/>
+          <a:p>
+            <a:pPr marL="0" indent="0">
+              <a:buNone/>
+            </a:pPr>
+            <a:r>
+              <a:rPr lang="en-US" sz="4800" dirty="0"/>
+              <a:t>ENVIRONMENT DIVISION.</a:t>
+            </a:r>
+          </a:p>
+          <a:p>
+            <a:pPr marL="0" indent="0">
+              <a:buNone/>
+            </a:pPr>
+            <a:r>
+              <a:rPr lang="en-US" sz="4800" dirty="0"/>
+              <a:t>INPUT-OUTPUT SECTION.</a:t>
+            </a:r>
+          </a:p>
+          <a:p>
+            <a:pPr marL="0" indent="0">
+              <a:buNone/>
+            </a:pPr>
+            <a:r>
+              <a:rPr lang="en-US" sz="4800" dirty="0"/>
+              <a:t>FILE-CONTROL.</a:t>
+            </a:r>
+          </a:p>
+          <a:p>
+            <a:pPr marL="0" indent="0">
+              <a:buNone/>
+            </a:pPr>
+            <a:r>
+              <a:rPr lang="en-US" sz="4800" dirty="0"/>
+              <a:t>    SELECT </a:t>
+            </a:r>
+            <a:r>
+              <a:rPr lang="en-US" sz="4800" dirty="0" err="1"/>
+              <a:t>StudentFile</a:t>
+            </a:r>
+            <a:r>
+              <a:rPr lang="en-US" sz="4800" dirty="0"/>
+              <a:t> ASSIGN TO "STUDENTS.DAT"</a:t>
+            </a:r>
+          </a:p>
+          <a:p>
+            <a:pPr marL="0" indent="0">
+              <a:buNone/>
+            </a:pPr>
+            <a:r>
+              <a:rPr lang="en-US" sz="4800" dirty="0"/>
+              <a:t>             ORGANIZATION IS LINE SEQUENTIAL.</a:t>
+            </a:r>
+          </a:p>
+          <a:p>
+            <a:pPr marL="0" indent="0">
+              <a:buNone/>
+            </a:pPr>
+            <a:endParaRPr lang="en-US" sz="4800" dirty="0"/>
+          </a:p>
+          <a:p>
+            <a:pPr marL="0" indent="0">
+              <a:buNone/>
+            </a:pPr>
+            <a:r>
+              <a:rPr lang="en-US" sz="4800" dirty="0"/>
+              <a:t>    SELECT </a:t>
+            </a:r>
+            <a:r>
+              <a:rPr lang="en-US" sz="4800" dirty="0" err="1"/>
+              <a:t>InsertionsFile</a:t>
+            </a:r>
+            <a:r>
+              <a:rPr lang="en-US" sz="4800" dirty="0"/>
+              <a:t> ASSIGN TO "TRANSINS.DAT"</a:t>
+            </a:r>
+          </a:p>
+          <a:p>
+            <a:pPr marL="0" indent="0">
+              <a:buNone/>
+            </a:pPr>
+            <a:r>
+              <a:rPr lang="en-US" sz="4800" dirty="0"/>
+              <a:t>             ORGANIZATION IS LINE SEQUENTIAL.</a:t>
+            </a:r>
+          </a:p>
+          <a:p>
+            <a:pPr marL="0" indent="0">
+              <a:buNone/>
+            </a:pPr>
+            <a:endParaRPr lang="en-US" sz="4800" dirty="0"/>
+          </a:p>
+          <a:p>
+            <a:pPr marL="0" indent="0">
+              <a:buNone/>
+            </a:pPr>
+            <a:r>
+              <a:rPr lang="en-US" sz="4800" dirty="0"/>
+              <a:t>    SELECT </a:t>
+            </a:r>
+            <a:r>
+              <a:rPr lang="en-US" sz="4800" dirty="0" err="1"/>
+              <a:t>NewStudentFile</a:t>
+            </a:r>
+            <a:r>
+              <a:rPr lang="en-US" sz="4800" dirty="0"/>
+              <a:t>    ASSIGN TO "STUDENTS.NEW"</a:t>
+            </a:r>
+          </a:p>
+          <a:p>
+            <a:pPr marL="0" indent="0">
+              <a:buNone/>
+            </a:pPr>
+            <a:r>
+              <a:rPr lang="en-US" sz="4800" dirty="0"/>
+              <a:t>             ORGANIZATION IS LINE SEQUENTIAL.</a:t>
+            </a:r>
+          </a:p>
+          <a:p>
+            <a:pPr marL="0" indent="0">
+              <a:buNone/>
+            </a:pPr>
+            <a:endParaRPr lang="en-US" sz="4800" dirty="0"/>
+          </a:p>
+          <a:p>
+            <a:pPr marL="0" indent="0">
+              <a:buNone/>
+            </a:pPr>
+            <a:r>
+              <a:rPr lang="en-US" sz="4800" dirty="0"/>
+              <a:t>    SELECT </a:t>
+            </a:r>
+            <a:r>
+              <a:rPr lang="en-US" sz="4800" dirty="0" err="1"/>
+              <a:t>WorkFile</a:t>
+            </a:r>
+            <a:r>
+              <a:rPr lang="en-US" sz="4800" dirty="0"/>
+              <a:t> ASSIGN TO "WORK.TMP".</a:t>
+            </a:r>
+          </a:p>
+          <a:p>
+            <a:endParaRPr lang="en-US" dirty="0"/>
+          </a:p>
+        </p:txBody>
+      </p:sp>
+      <p:sp>
+        <p:nvSpPr>
+          <p:cNvPr id="6" name="Content Placeholder 5"/>
+          <p:cNvSpPr>
+            <a:spLocks noGrp="1"/>
+          </p:cNvSpPr>
+          <p:nvPr>
+            <p:ph sz="half" idx="2"/>
+          </p:nvPr>
+        </p:nvSpPr>
+        <p:spPr>
+          <a:xfrm>
+            <a:off x="3856839" y="1825624"/>
+            <a:ext cx="3215081" cy="4877179"/>
+          </a:xfrm>
+        </p:spPr>
+        <p:txBody>
+          <a:bodyPr>
+            <a:noAutofit/>
+          </a:bodyPr>
+          <a:lstStyle/>
+          <a:p>
+            <a:pPr marL="0" indent="0">
+              <a:buNone/>
+            </a:pPr>
+            <a:r>
+              <a:rPr lang="en-US" sz="1400" dirty="0"/>
+              <a:t>DATA DIVISION.</a:t>
+            </a:r>
+          </a:p>
+          <a:p>
+            <a:pPr marL="0" indent="0">
+              <a:buNone/>
+            </a:pPr>
+            <a:r>
+              <a:rPr lang="en-US" sz="1400" dirty="0"/>
+              <a:t>FILE SECTION.</a:t>
+            </a:r>
+          </a:p>
+          <a:p>
+            <a:pPr marL="0" indent="0">
+              <a:buNone/>
+            </a:pPr>
+            <a:r>
+              <a:rPr lang="en-US" sz="1400" dirty="0"/>
+              <a:t>FD  </a:t>
+            </a:r>
+            <a:r>
+              <a:rPr lang="en-US" sz="1400" dirty="0" err="1"/>
+              <a:t>StudentFile</a:t>
+            </a:r>
+            <a:r>
+              <a:rPr lang="en-US" sz="1400" dirty="0"/>
+              <a:t>.</a:t>
+            </a:r>
+          </a:p>
+          <a:p>
+            <a:pPr marL="0" indent="0">
+              <a:buNone/>
+            </a:pPr>
+            <a:r>
+              <a:rPr lang="en-US" sz="1400" dirty="0"/>
+              <a:t>01  </a:t>
+            </a:r>
+            <a:r>
+              <a:rPr lang="en-US" sz="1400" dirty="0" err="1"/>
+              <a:t>StudentRec</a:t>
+            </a:r>
+            <a:r>
+              <a:rPr lang="en-US" sz="1400" dirty="0"/>
+              <a:t>             PIC X(30).</a:t>
+            </a:r>
+          </a:p>
+          <a:p>
+            <a:pPr marL="0" indent="0">
+              <a:buNone/>
+            </a:pPr>
+            <a:endParaRPr lang="en-US" sz="1400" dirty="0"/>
+          </a:p>
+          <a:p>
+            <a:pPr marL="0" indent="0">
+              <a:buNone/>
+            </a:pPr>
+            <a:r>
+              <a:rPr lang="en-US" sz="1400" dirty="0"/>
+              <a:t>FD  </a:t>
+            </a:r>
+            <a:r>
+              <a:rPr lang="en-US" sz="1400" dirty="0" err="1"/>
+              <a:t>InsertionsFile</a:t>
+            </a:r>
+            <a:r>
+              <a:rPr lang="en-US" sz="1400" dirty="0"/>
+              <a:t>.</a:t>
+            </a:r>
+          </a:p>
+          <a:p>
+            <a:pPr marL="0" indent="0">
+              <a:buNone/>
+            </a:pPr>
+            <a:r>
+              <a:rPr lang="en-US" sz="1400" dirty="0"/>
+              <a:t>01  </a:t>
+            </a:r>
+            <a:r>
+              <a:rPr lang="en-US" sz="1400" dirty="0" err="1"/>
+              <a:t>InsertionRec</a:t>
+            </a:r>
+            <a:r>
+              <a:rPr lang="en-US" sz="1400" dirty="0"/>
+              <a:t>           PIC X(30).</a:t>
+            </a:r>
+          </a:p>
+          <a:p>
+            <a:pPr marL="0" indent="0">
+              <a:buNone/>
+            </a:pPr>
+            <a:endParaRPr lang="en-US" sz="1400" dirty="0"/>
+          </a:p>
+          <a:p>
+            <a:pPr marL="0" indent="0">
+              <a:buNone/>
+            </a:pPr>
+            <a:r>
+              <a:rPr lang="en-US" sz="1400" dirty="0"/>
+              <a:t>FD  </a:t>
+            </a:r>
+            <a:r>
+              <a:rPr lang="en-US" sz="1400" dirty="0" err="1"/>
+              <a:t>NewStudentFile</a:t>
+            </a:r>
+            <a:r>
+              <a:rPr lang="en-US" sz="1400" dirty="0"/>
+              <a:t>.</a:t>
+            </a:r>
+          </a:p>
+          <a:p>
+            <a:pPr marL="0" indent="0">
+              <a:buNone/>
+            </a:pPr>
+            <a:r>
+              <a:rPr lang="en-US" sz="1400" dirty="0"/>
+              <a:t>01  </a:t>
+            </a:r>
+            <a:r>
+              <a:rPr lang="en-US" sz="1400" dirty="0" err="1"/>
+              <a:t>NewStudentRec</a:t>
+            </a:r>
+            <a:r>
+              <a:rPr lang="en-US" sz="1400" dirty="0"/>
+              <a:t>          PIC X(30).</a:t>
+            </a:r>
+          </a:p>
+          <a:p>
+            <a:pPr marL="0" indent="0">
+              <a:buNone/>
+            </a:pPr>
+            <a:endParaRPr lang="en-US" sz="1400" dirty="0"/>
+          </a:p>
+          <a:p>
+            <a:pPr marL="0" indent="0">
+              <a:buNone/>
+            </a:pPr>
+            <a:r>
+              <a:rPr lang="en-US" sz="1400" dirty="0"/>
+              <a:t>SD  </a:t>
+            </a:r>
+            <a:r>
+              <a:rPr lang="en-US" sz="1400" dirty="0" err="1"/>
+              <a:t>WorkFile</a:t>
+            </a:r>
+            <a:r>
+              <a:rPr lang="en-US" sz="1400" dirty="0"/>
+              <a:t>.</a:t>
+            </a:r>
+          </a:p>
+          <a:p>
+            <a:pPr marL="0" indent="0">
+              <a:buNone/>
+            </a:pPr>
+            <a:r>
+              <a:rPr lang="en-US" sz="1400" dirty="0"/>
+              <a:t>01  </a:t>
+            </a:r>
+            <a:r>
+              <a:rPr lang="en-US" sz="1400" dirty="0" err="1"/>
+              <a:t>WorkRec</a:t>
+            </a:r>
+            <a:r>
+              <a:rPr lang="en-US" sz="1400" dirty="0"/>
+              <a:t>.</a:t>
+            </a:r>
+          </a:p>
+          <a:p>
+            <a:pPr marL="0" indent="0">
+              <a:buNone/>
+            </a:pPr>
+            <a:r>
+              <a:rPr lang="en-US" sz="1400" dirty="0"/>
+              <a:t>    02 </a:t>
+            </a:r>
+            <a:r>
+              <a:rPr lang="en-US" sz="1400" dirty="0" err="1"/>
+              <a:t>WStudentId</a:t>
+            </a:r>
+            <a:r>
+              <a:rPr lang="en-US" sz="1400" dirty="0"/>
+              <a:t>          PIC 9(7).</a:t>
+            </a:r>
+          </a:p>
+          <a:p>
+            <a:pPr marL="0" indent="0">
+              <a:buNone/>
+            </a:pPr>
+            <a:r>
+              <a:rPr lang="en-US" sz="1400" dirty="0"/>
+              <a:t>    02 FILLER              PIC X(23).</a:t>
+            </a:r>
+            <a:endParaRPr lang="en-US" sz="1400" dirty="0"/>
+          </a:p>
+        </p:txBody>
+      </p:sp>
+      <p:sp>
+        <p:nvSpPr>
+          <p:cNvPr id="7" name="Content Placeholder 5"/>
+          <p:cNvSpPr txBox="1">
+            <a:spLocks/>
+          </p:cNvSpPr>
+          <p:nvPr/>
+        </p:nvSpPr>
+        <p:spPr>
+          <a:xfrm>
+            <a:off x="7725562" y="1825625"/>
+            <a:ext cx="3215081" cy="4351338"/>
+          </a:xfrm>
+          <a:prstGeom prst="rect">
+            <a:avLst/>
+          </a:prstGeom>
+        </p:spPr>
+        <p:txBody>
+          <a:bodyPr vert="horz" lIns="91440" tIns="45720" rIns="91440" bIns="45720" rtlCol="0">
+            <a:normAutofit/>
+          </a:bodyPr>
+          <a:lstStyle>
+            <a:lvl1pPr marL="228600" indent="-228600" algn="l" defTabSz="914400" rtl="0" eaLnBrk="1" latinLnBrk="0" hangingPunct="1">
+              <a:lnSpc>
+                <a:spcPct val="90000"/>
+              </a:lnSpc>
+              <a:spcBef>
+                <a:spcPts val="1000"/>
+              </a:spcBef>
+              <a:buFont typeface="Arial" panose="020B0604020202020204" pitchFamily="34" charset="0"/>
+              <a:buChar char="•"/>
+              <a:defRPr sz="2800" kern="1200">
+                <a:solidFill>
+                  <a:schemeClr val="tx1"/>
+                </a:solidFill>
+                <a:latin typeface="+mn-lt"/>
+                <a:ea typeface="+mn-ea"/>
+                <a:cs typeface="+mn-cs"/>
+              </a:defRPr>
+            </a:lvl1pPr>
+            <a:lvl2pPr marL="685800" indent="-228600" algn="l" defTabSz="914400" rtl="0" eaLnBrk="1" latinLnBrk="0" hangingPunct="1">
+              <a:lnSpc>
+                <a:spcPct val="90000"/>
+              </a:lnSpc>
+              <a:spcBef>
+                <a:spcPts val="500"/>
+              </a:spcBef>
+              <a:buFont typeface="Arial" panose="020B0604020202020204" pitchFamily="34" charset="0"/>
+              <a:buChar char="•"/>
+              <a:defRPr sz="2400" kern="1200">
+                <a:solidFill>
+                  <a:schemeClr val="tx1"/>
+                </a:solidFill>
+                <a:latin typeface="+mn-lt"/>
+                <a:ea typeface="+mn-ea"/>
+                <a:cs typeface="+mn-cs"/>
+              </a:defRPr>
+            </a:lvl2pPr>
+            <a:lvl3pPr marL="1143000" indent="-228600" algn="l" defTabSz="914400" rtl="0" eaLnBrk="1" latinLnBrk="0" hangingPunct="1">
+              <a:lnSpc>
+                <a:spcPct val="90000"/>
+              </a:lnSpc>
+              <a:spcBef>
+                <a:spcPts val="500"/>
+              </a:spcBef>
+              <a:buFont typeface="Arial" panose="020B0604020202020204" pitchFamily="34" charset="0"/>
+              <a:buChar char="•"/>
+              <a:defRPr sz="2000" kern="1200">
+                <a:solidFill>
+                  <a:schemeClr val="tx1"/>
+                </a:solidFill>
+                <a:latin typeface="+mn-lt"/>
+                <a:ea typeface="+mn-ea"/>
+                <a:cs typeface="+mn-cs"/>
+              </a:defRPr>
+            </a:lvl3pPr>
+            <a:lvl4pPr marL="1600200" indent="-228600" algn="l" defTabSz="914400" rtl="0" eaLnBrk="1" latinLnBrk="0" hangingPunct="1">
+              <a:lnSpc>
+                <a:spcPct val="90000"/>
+              </a:lnSpc>
+              <a:spcBef>
+                <a:spcPts val="500"/>
+              </a:spcBef>
+              <a:buFont typeface="Arial" panose="020B0604020202020204" pitchFamily="34" charset="0"/>
+              <a:buChar char="•"/>
+              <a:defRPr sz="1800" kern="1200">
+                <a:solidFill>
+                  <a:schemeClr val="tx1"/>
+                </a:solidFill>
+                <a:latin typeface="+mn-lt"/>
+                <a:ea typeface="+mn-ea"/>
+                <a:cs typeface="+mn-cs"/>
+              </a:defRPr>
+            </a:lvl4pPr>
+            <a:lvl5pPr marL="2057400" indent="-228600" algn="l" defTabSz="914400" rtl="0" eaLnBrk="1" latinLnBrk="0" hangingPunct="1">
+              <a:lnSpc>
+                <a:spcPct val="90000"/>
+              </a:lnSpc>
+              <a:spcBef>
+                <a:spcPts val="500"/>
+              </a:spcBef>
+              <a:buFont typeface="Arial" panose="020B0604020202020204" pitchFamily="34" charset="0"/>
+              <a:buChar char="•"/>
+              <a:defRPr sz="1800" kern="1200">
+                <a:solidFill>
+                  <a:schemeClr val="tx1"/>
+                </a:solidFill>
+                <a:latin typeface="+mn-lt"/>
+                <a:ea typeface="+mn-ea"/>
+                <a:cs typeface="+mn-cs"/>
+              </a:defRPr>
+            </a:lvl5pPr>
+            <a:lvl6pPr marL="2514600" indent="-228600" algn="l" defTabSz="914400" rtl="0" eaLnBrk="1" latinLnBrk="0" hangingPunct="1">
+              <a:lnSpc>
+                <a:spcPct val="90000"/>
+              </a:lnSpc>
+              <a:spcBef>
+                <a:spcPts val="500"/>
+              </a:spcBef>
+              <a:buFont typeface="Arial" panose="020B0604020202020204" pitchFamily="34" charset="0"/>
+              <a:buChar char="•"/>
+              <a:defRPr sz="1800" kern="1200">
+                <a:solidFill>
+                  <a:schemeClr val="tx1"/>
+                </a:solidFill>
+                <a:latin typeface="+mn-lt"/>
+                <a:ea typeface="+mn-ea"/>
+                <a:cs typeface="+mn-cs"/>
+              </a:defRPr>
+            </a:lvl6pPr>
+            <a:lvl7pPr marL="2971800" indent="-228600" algn="l" defTabSz="914400" rtl="0" eaLnBrk="1" latinLnBrk="0" hangingPunct="1">
+              <a:lnSpc>
+                <a:spcPct val="90000"/>
+              </a:lnSpc>
+              <a:spcBef>
+                <a:spcPts val="500"/>
+              </a:spcBef>
+              <a:buFont typeface="Arial" panose="020B0604020202020204" pitchFamily="34" charset="0"/>
+              <a:buChar char="•"/>
+              <a:defRPr sz="1800" kern="1200">
+                <a:solidFill>
+                  <a:schemeClr val="tx1"/>
+                </a:solidFill>
+                <a:latin typeface="+mn-lt"/>
+                <a:ea typeface="+mn-ea"/>
+                <a:cs typeface="+mn-cs"/>
+              </a:defRPr>
+            </a:lvl7pPr>
+            <a:lvl8pPr marL="3429000" indent="-228600" algn="l" defTabSz="914400" rtl="0" eaLnBrk="1" latinLnBrk="0" hangingPunct="1">
+              <a:lnSpc>
+                <a:spcPct val="90000"/>
+              </a:lnSpc>
+              <a:spcBef>
+                <a:spcPts val="500"/>
+              </a:spcBef>
+              <a:buFont typeface="Arial" panose="020B0604020202020204" pitchFamily="34" charset="0"/>
+              <a:buChar char="•"/>
+              <a:defRPr sz="1800" kern="1200">
+                <a:solidFill>
+                  <a:schemeClr val="tx1"/>
+                </a:solidFill>
+                <a:latin typeface="+mn-lt"/>
+                <a:ea typeface="+mn-ea"/>
+                <a:cs typeface="+mn-cs"/>
+              </a:defRPr>
+            </a:lvl8pPr>
+            <a:lvl9pPr marL="3886200" indent="-228600" algn="l" defTabSz="914400" rtl="0" eaLnBrk="1" latinLnBrk="0" hangingPunct="1">
+              <a:lnSpc>
+                <a:spcPct val="90000"/>
+              </a:lnSpc>
+              <a:spcBef>
+                <a:spcPts val="500"/>
+              </a:spcBef>
+              <a:buFont typeface="Arial" panose="020B0604020202020204" pitchFamily="34" charset="0"/>
+              <a:buChar char="•"/>
+              <a:defRPr sz="1800" kern="1200">
+                <a:solidFill>
+                  <a:schemeClr val="tx1"/>
+                </a:solidFill>
+                <a:latin typeface="+mn-lt"/>
+                <a:ea typeface="+mn-ea"/>
+                <a:cs typeface="+mn-cs"/>
+              </a:defRPr>
+            </a:lvl9pPr>
+          </a:lstStyle>
+          <a:p>
+            <a:pPr marL="0" indent="0">
+              <a:buFont typeface="Arial" panose="020B0604020202020204" pitchFamily="34" charset="0"/>
+              <a:buNone/>
+            </a:pPr>
+            <a:endParaRPr lang="en-US" dirty="0"/>
+          </a:p>
+        </p:txBody>
+      </p:sp>
+      <p:sp>
+        <p:nvSpPr>
+          <p:cNvPr id="9" name="Rectangle 8"/>
+          <p:cNvSpPr/>
+          <p:nvPr/>
+        </p:nvSpPr>
+        <p:spPr>
+          <a:xfrm>
+            <a:off x="7252981" y="1825624"/>
+            <a:ext cx="4160241" cy="1600438"/>
+          </a:xfrm>
+          <a:prstGeom prst="rect">
+            <a:avLst/>
+          </a:prstGeom>
+        </p:spPr>
+        <p:txBody>
+          <a:bodyPr wrap="square">
+            <a:spAutoFit/>
+          </a:bodyPr>
+          <a:lstStyle/>
+          <a:p>
+            <a:r>
+              <a:rPr lang="en-US" sz="1400" dirty="0"/>
+              <a:t>PROCEDURE DIVISION.</a:t>
+            </a:r>
+          </a:p>
+          <a:p>
+            <a:r>
+              <a:rPr lang="en-US" sz="1400" dirty="0"/>
+              <a:t>Begin.</a:t>
+            </a:r>
+          </a:p>
+          <a:p>
+            <a:r>
+              <a:rPr lang="en-US" sz="1400" dirty="0"/>
+              <a:t>    MERGE </a:t>
+            </a:r>
+            <a:r>
+              <a:rPr lang="en-US" sz="1400" dirty="0" err="1"/>
+              <a:t>WorkFile</a:t>
+            </a:r>
+            <a:endParaRPr lang="en-US" sz="1400" dirty="0"/>
+          </a:p>
+          <a:p>
+            <a:r>
+              <a:rPr lang="en-US" sz="1400" dirty="0"/>
+              <a:t>       ON ASCENDING KEY </a:t>
+            </a:r>
+            <a:r>
+              <a:rPr lang="en-US" sz="1400" dirty="0" err="1"/>
+              <a:t>WStudentId</a:t>
+            </a:r>
+            <a:endParaRPr lang="en-US" sz="1400" dirty="0"/>
+          </a:p>
+          <a:p>
+            <a:r>
+              <a:rPr lang="en-US" sz="1400" dirty="0"/>
+              <a:t>       USING </a:t>
+            </a:r>
+            <a:r>
+              <a:rPr lang="en-US" sz="1400" dirty="0" err="1"/>
+              <a:t>InsertionsFile</a:t>
+            </a:r>
+            <a:r>
+              <a:rPr lang="en-US" sz="1400" dirty="0"/>
+              <a:t>,  </a:t>
+            </a:r>
+            <a:r>
+              <a:rPr lang="en-US" sz="1400" dirty="0" err="1"/>
+              <a:t>StudentFile</a:t>
+            </a:r>
+            <a:endParaRPr lang="en-US" sz="1400" dirty="0"/>
+          </a:p>
+          <a:p>
+            <a:r>
+              <a:rPr lang="en-US" sz="1400" dirty="0"/>
+              <a:t>       GIVING </a:t>
+            </a:r>
+            <a:r>
+              <a:rPr lang="en-US" sz="1400" dirty="0" err="1"/>
+              <a:t>NewStudentFile</a:t>
+            </a:r>
+            <a:r>
+              <a:rPr lang="en-US" sz="1400" dirty="0"/>
+              <a:t>.</a:t>
+            </a:r>
+          </a:p>
+          <a:p>
+            <a:r>
+              <a:rPr lang="en-US" sz="1400" dirty="0"/>
+              <a:t>    STOP RUN.</a:t>
+            </a:r>
+            <a:endParaRPr lang="en-US" sz="1400" dirty="0"/>
+          </a:p>
+        </p:txBody>
+      </p:sp>
+      <p:sp>
+        <p:nvSpPr>
+          <p:cNvPr id="10" name="TextBox 9"/>
+          <p:cNvSpPr txBox="1"/>
+          <p:nvPr/>
+        </p:nvSpPr>
+        <p:spPr>
+          <a:xfrm>
+            <a:off x="7218342" y="6176963"/>
+            <a:ext cx="3244799" cy="369332"/>
+          </a:xfrm>
+          <a:prstGeom prst="rect">
+            <a:avLst/>
+          </a:prstGeom>
+          <a:noFill/>
+        </p:spPr>
+        <p:txBody>
+          <a:bodyPr wrap="none" rtlCol="0">
+            <a:spAutoFit/>
+          </a:bodyPr>
+          <a:lstStyle/>
+          <a:p>
+            <a:r>
+              <a:rPr lang="en-US" dirty="0"/>
+              <a:t>Source: </a:t>
+            </a:r>
+            <a:r>
+              <a:rPr lang="en-US" dirty="0">
+                <a:hlinkClick r:id="rId2"/>
+              </a:rPr>
+              <a:t>University of Limerick CS</a:t>
+            </a:r>
+            <a:endParaRPr lang="en-US" dirty="0"/>
+          </a:p>
+        </p:txBody>
+      </p:sp>
+    </p:spTree>
+    <p:extLst>
+      <p:ext uri="{BB962C8B-B14F-4D97-AF65-F5344CB8AC3E}">
+        <p14:creationId xmlns:p14="http://schemas.microsoft.com/office/powerpoint/2010/main" val="3683317127"/>
+      </p:ext>
+    </p:extLst>
+  </p:cSld>
+  <p:clrMapOvr>
+    <a:masterClrMapping/>
+  </p:clrMapOvr>
+</p:sld>
+</file>
+
 <file path=ppt/slides/slide2.xml><?xml version="1.0" encoding="utf-8"?>
 <p:sld xmlns:a="http://schemas.openxmlformats.org/drawingml/2006/main" xmlns:r="http://schemas.openxmlformats.org/officeDocument/2006/relationships" xmlns:p="http://schemas.openxmlformats.org/presentationml/2006/main">
   <p:cSld>

</xml_diff>